<commit_message>
final version minus two
</commit_message>
<xml_diff>
--- a/_figure/results/branch_perf.pptx
+++ b/_figure/results/branch_perf.pptx
@@ -246,7 +246,7 @@
                   <c:v>1.003847666666671</c:v>
                 </c:pt>
                 <c:pt idx="3">
-                  <c:v>2.41696566666664</c:v>
+                  <c:v>2.416965666666639</c:v>
                 </c:pt>
                 <c:pt idx="4">
                   <c:v>4.057049999999977</c:v>
@@ -261,7 +261,7 @@
                   <c:v>1.402452999999998</c:v>
                 </c:pt>
                 <c:pt idx="9">
-                  <c:v>2.986879333333286</c:v>
+                  <c:v>2.986879333333285</c:v>
                 </c:pt>
                 <c:pt idx="10">
                   <c:v>5.068896333333316</c:v>
@@ -276,7 +276,7 @@
                   <c:v>1.688410000000003</c:v>
                 </c:pt>
                 <c:pt idx="15">
-                  <c:v>6.273713333333326</c:v>
+                  <c:v>6.273713333333327</c:v>
                 </c:pt>
                 <c:pt idx="16">
                   <c:v>7.059927000000003</c:v>
@@ -426,7 +426,7 @@
                   <c:v>3.79175666666667</c:v>
                 </c:pt>
                 <c:pt idx="10">
-                  <c:v>6.422024000000009</c:v>
+                  <c:v>6.422024000000008</c:v>
                 </c:pt>
                 <c:pt idx="12">
                   <c:v>0.119314999999999</c:v>
@@ -447,16 +447,16 @@
                   <c:v>3.03287199999999</c:v>
                 </c:pt>
                 <c:pt idx="19">
-                  <c:v>3.466806333333327</c:v>
+                  <c:v>3.466806333333326</c:v>
                 </c:pt>
                 <c:pt idx="20">
-                  <c:v>4.098710666666673</c:v>
+                  <c:v>4.098710666666672</c:v>
                 </c:pt>
                 <c:pt idx="21">
                   <c:v>5.15121733333334</c:v>
                 </c:pt>
                 <c:pt idx="22">
-                  <c:v>6.324371999999952</c:v>
+                  <c:v>6.324371999999951</c:v>
                 </c:pt>
               </c:numCache>
             </c:numRef>
@@ -897,7 +897,7 @@
                   <c:v>0.805210666666662</c:v>
                 </c:pt>
                 <c:pt idx="4">
-                  <c:v>1.196817666666629</c:v>
+                  <c:v>1.19681766666663</c:v>
                 </c:pt>
                 <c:pt idx="6">
                   <c:v>0.0433276666666666</c:v>
@@ -936,7 +936,7 @@
                   <c:v>1.093833333333325</c:v>
                 </c:pt>
                 <c:pt idx="20">
-                  <c:v>1.096832666666669</c:v>
+                  <c:v>1.09683266666667</c:v>
                 </c:pt>
                 <c:pt idx="21">
                   <c:v>1.128827333333277</c:v>
@@ -958,11 +958,11 @@
         </c:dLbls>
         <c:gapWidth val="33"/>
         <c:overlap val="100"/>
-        <c:axId val="-2140679640"/>
-        <c:axId val="-2140473080"/>
+        <c:axId val="2021558104"/>
+        <c:axId val="2021561592"/>
       </c:barChart>
       <c:catAx>
-        <c:axId val="-2140679640"/>
+        <c:axId val="2021558104"/>
         <c:scaling>
           <c:orientation val="minMax"/>
         </c:scaling>
@@ -984,15 +984,12 @@
           <a:lstStyle/>
           <a:p>
             <a:pPr>
-              <a:defRPr>
-                <a:latin typeface="Times New Roman"/>
-                <a:cs typeface="Times New Roman"/>
-              </a:defRPr>
+              <a:defRPr sz="1200"/>
             </a:pPr>
             <a:endParaRPr lang="zh-CN"/>
           </a:p>
         </c:txPr>
-        <c:crossAx val="-2140473080"/>
+        <c:crossAx val="2021561592"/>
         <c:crosses val="autoZero"/>
         <c:auto val="1"/>
         <c:lblAlgn val="ctr"/>
@@ -1000,7 +997,7 @@
         <c:noMultiLvlLbl val="0"/>
       </c:catAx>
       <c:valAx>
-        <c:axId val="-2140473080"/>
+        <c:axId val="2021561592"/>
         <c:scaling>
           <c:orientation val="minMax"/>
           <c:max val="22.0"/>
@@ -1035,22 +1032,13 @@
               <a:lstStyle/>
               <a:p>
                 <a:pPr>
-                  <a:defRPr sz="1200">
-                    <a:latin typeface="Times New Roman"/>
-                    <a:cs typeface="Times New Roman"/>
-                  </a:defRPr>
+                  <a:defRPr sz="1400"/>
                 </a:pPr>
                 <a:r>
-                  <a:rPr lang="en-US" sz="1200">
-                    <a:latin typeface="Times New Roman"/>
-                    <a:cs typeface="Times New Roman"/>
-                  </a:rPr>
+                  <a:rPr lang="en-US" sz="1400"/>
                   <a:t>timie [sec]</a:t>
                 </a:r>
-                <a:endParaRPr lang="zh-CN" sz="1200">
-                  <a:latin typeface="Times New Roman"/>
-                  <a:cs typeface="Times New Roman"/>
-                </a:endParaRPr>
+                <a:endParaRPr lang="zh-CN" sz="1400"/>
               </a:p>
             </c:rich>
           </c:tx>
@@ -1073,15 +1061,12 @@
           <a:lstStyle/>
           <a:p>
             <a:pPr>
-              <a:defRPr>
-                <a:latin typeface="Times New Roman"/>
-                <a:cs typeface="Times New Roman"/>
-              </a:defRPr>
+              <a:defRPr sz="1200"/>
             </a:pPr>
             <a:endParaRPr lang="zh-CN"/>
           </a:p>
         </c:txPr>
-        <c:crossAx val="-2140679640"/>
+        <c:crossAx val="2021558104"/>
         <c:crosses val="autoZero"/>
         <c:crossBetween val="between"/>
         <c:majorUnit val="2.0"/>
@@ -1103,10 +1088,7 @@
         <a:lstStyle/>
         <a:p>
           <a:pPr>
-            <a:defRPr sz="1200">
-              <a:latin typeface="Times New Roman"/>
-              <a:cs typeface="Times New Roman"/>
-            </a:defRPr>
+            <a:defRPr sz="1400"/>
           </a:pPr>
           <a:endParaRPr lang="zh-CN"/>
         </a:p>
@@ -1121,6 +1103,19 @@
       <a:noFill/>
     </a:ln>
   </c:spPr>
+  <c:txPr>
+    <a:bodyPr/>
+    <a:lstStyle/>
+    <a:p>
+      <a:pPr>
+        <a:defRPr sz="1100">
+          <a:latin typeface="Times New Roman"/>
+          <a:cs typeface="Times New Roman"/>
+        </a:defRPr>
+      </a:pPr>
+      <a:endParaRPr lang="zh-CN"/>
+    </a:p>
+  </c:txPr>
   <c:externalData r:id="rId1">
     <c:autoUpdate val="0"/>
   </c:externalData>
@@ -1900,7 +1895,7 @@
         <a:lstStyle/>
         <a:p>
           <a:r>
-            <a:rPr lang="en-US" altLang="zh-CN" sz="1200" b="1">
+            <a:rPr lang="en-US" altLang="zh-CN" sz="1200" b="1" dirty="0">
               <a:solidFill>
                 <a:schemeClr val="tx1"/>
               </a:solidFill>
@@ -1909,7 +1904,7 @@
             </a:rPr>
             <a:t>standard</a:t>
           </a:r>
-          <a:endParaRPr lang="zh-CN" altLang="en-US" sz="1200" b="1">
+          <a:endParaRPr lang="zh-CN" altLang="en-US" sz="1200" b="1" dirty="0">
             <a:solidFill>
               <a:schemeClr val="tx1"/>
             </a:solidFill>
@@ -2095,16 +2090,36 @@
         <a:lstStyle/>
         <a:p>
           <a:r>
-            <a:rPr lang="en-US" altLang="zh-CN" sz="1200" b="1">
+            <a:rPr lang="en-US" altLang="zh-CN" sz="1200" b="1" dirty="0">
               <a:solidFill>
                 <a:schemeClr val="tx1"/>
               </a:solidFill>
               <a:latin typeface="Times New Roman"/>
               <a:cs typeface="Times New Roman"/>
             </a:rPr>
-            <a:t>standard (mmax=5)</a:t>
+            <a:t>standard (</a:t>
           </a:r>
-          <a:endParaRPr lang="zh-CN" altLang="en-US" sz="1200" b="1">
+          <a:r>
+            <a:rPr lang="en-US" altLang="zh-CN" sz="1200" b="1" dirty="0" err="1">
+              <a:solidFill>
+                <a:schemeClr val="tx1"/>
+              </a:solidFill>
+              <a:latin typeface="Times New Roman"/>
+              <a:cs typeface="Times New Roman"/>
+            </a:rPr>
+            <a:t>mmax</a:t>
+          </a:r>
+          <a:r>
+            <a:rPr lang="en-US" altLang="zh-CN" sz="1200" b="1" dirty="0">
+              <a:solidFill>
+                <a:schemeClr val="tx1"/>
+              </a:solidFill>
+              <a:latin typeface="Times New Roman"/>
+              <a:cs typeface="Times New Roman"/>
+            </a:rPr>
+            <a:t>=5)</a:t>
+          </a:r>
+          <a:endParaRPr lang="zh-CN" altLang="en-US" sz="1200" b="1" dirty="0">
             <a:solidFill>
               <a:schemeClr val="tx1"/>
             </a:solidFill>
@@ -2282,8 +2297,8 @@
       </dsp:nvSpPr>
       <dsp:spPr>
         <a:xfrm>
-          <a:off x="3690" y="57562"/>
-          <a:ext cx="1677458" cy="100774"/>
+          <a:off x="3827" y="55703"/>
+          <a:ext cx="1739365" cy="104493"/>
         </a:xfrm>
         <a:prstGeom prst="rect">
           <a:avLst/>
@@ -2336,7 +2351,7 @@
             </a:spcAft>
           </a:pPr>
           <a:r>
-            <a:rPr lang="en-US" altLang="zh-CN" sz="1200" b="1" kern="1200">
+            <a:rPr lang="en-US" altLang="zh-CN" sz="1200" b="1" kern="1200" dirty="0">
               <a:solidFill>
                 <a:schemeClr val="tx1"/>
               </a:solidFill>
@@ -2345,7 +2360,7 @@
             </a:rPr>
             <a:t>standard</a:t>
           </a:r>
-          <a:endParaRPr lang="zh-CN" altLang="en-US" sz="1200" b="1" kern="1200">
+          <a:endParaRPr lang="zh-CN" altLang="en-US" sz="1200" b="1" kern="1200" dirty="0">
             <a:solidFill>
               <a:schemeClr val="tx1"/>
             </a:solidFill>
@@ -2355,8 +2370,8 @@
         </a:p>
       </dsp:txBody>
       <dsp:txXfrm>
-        <a:off x="3690" y="57562"/>
-        <a:ext cx="1677458" cy="100774"/>
+        <a:off x="3827" y="55703"/>
+        <a:ext cx="1739365" cy="104493"/>
       </dsp:txXfrm>
     </dsp:sp>
     <dsp:sp modelId="{9474BD27-3FA9-B44D-8716-D362502FEF89}">
@@ -2366,8 +2381,8 @@
       </dsp:nvSpPr>
       <dsp:spPr>
         <a:xfrm>
-          <a:off x="1732310" y="57562"/>
-          <a:ext cx="1677458" cy="100774"/>
+          <a:off x="1796242" y="55703"/>
+          <a:ext cx="1739365" cy="104493"/>
         </a:xfrm>
         <a:prstGeom prst="rect">
           <a:avLst/>
@@ -2439,8 +2454,8 @@
         </a:p>
       </dsp:txBody>
       <dsp:txXfrm>
-        <a:off x="1732310" y="57562"/>
-        <a:ext cx="1677458" cy="100774"/>
+        <a:off x="1796242" y="55703"/>
+        <a:ext cx="1739365" cy="104493"/>
       </dsp:txXfrm>
     </dsp:sp>
     <dsp:sp modelId="{4CFDA77A-F4AF-D44F-9168-2CFE3C3B34F0}">
@@ -2450,8 +2465,8 @@
       </dsp:nvSpPr>
       <dsp:spPr>
         <a:xfrm>
-          <a:off x="3460930" y="57562"/>
-          <a:ext cx="1677458" cy="100774"/>
+          <a:off x="3588657" y="55703"/>
+          <a:ext cx="1739365" cy="104493"/>
         </a:xfrm>
         <a:prstGeom prst="rect">
           <a:avLst/>
@@ -2523,8 +2538,8 @@
         </a:p>
       </dsp:txBody>
       <dsp:txXfrm>
-        <a:off x="3460930" y="57562"/>
-        <a:ext cx="1677458" cy="100774"/>
+        <a:off x="3588657" y="55703"/>
+        <a:ext cx="1739365" cy="104493"/>
       </dsp:txXfrm>
     </dsp:sp>
     <dsp:sp modelId="{F560A6DA-24F4-5343-A074-1F67F0CB40A6}">
@@ -2534,8 +2549,8 @@
       </dsp:nvSpPr>
       <dsp:spPr>
         <a:xfrm>
-          <a:off x="5189550" y="57562"/>
-          <a:ext cx="1677458" cy="100774"/>
+          <a:off x="5381072" y="55703"/>
+          <a:ext cx="1739365" cy="104493"/>
         </a:xfrm>
         <a:prstGeom prst="rect">
           <a:avLst/>
@@ -2588,16 +2603,36 @@
             </a:spcAft>
           </a:pPr>
           <a:r>
-            <a:rPr lang="en-US" altLang="zh-CN" sz="1200" b="1" kern="1200">
+            <a:rPr lang="en-US" altLang="zh-CN" sz="1200" b="1" kern="1200" dirty="0">
               <a:solidFill>
                 <a:schemeClr val="tx1"/>
               </a:solidFill>
               <a:latin typeface="Times New Roman"/>
               <a:cs typeface="Times New Roman"/>
             </a:rPr>
-            <a:t>standard (mmax=5)</a:t>
+            <a:t>standard (</a:t>
           </a:r>
-          <a:endParaRPr lang="zh-CN" altLang="en-US" sz="1200" b="1" kern="1200">
+          <a:r>
+            <a:rPr lang="en-US" altLang="zh-CN" sz="1200" b="1" kern="1200" dirty="0" err="1">
+              <a:solidFill>
+                <a:schemeClr val="tx1"/>
+              </a:solidFill>
+              <a:latin typeface="Times New Roman"/>
+              <a:cs typeface="Times New Roman"/>
+            </a:rPr>
+            <a:t>mmax</a:t>
+          </a:r>
+          <a:r>
+            <a:rPr lang="en-US" altLang="zh-CN" sz="1200" b="1" kern="1200" dirty="0">
+              <a:solidFill>
+                <a:schemeClr val="tx1"/>
+              </a:solidFill>
+              <a:latin typeface="Times New Roman"/>
+              <a:cs typeface="Times New Roman"/>
+            </a:rPr>
+            <a:t>=5)</a:t>
+          </a:r>
+          <a:endParaRPr lang="zh-CN" altLang="en-US" sz="1200" b="1" kern="1200" dirty="0">
             <a:solidFill>
               <a:schemeClr val="tx1"/>
             </a:solidFill>
@@ -2607,8 +2642,8 @@
         </a:p>
       </dsp:txBody>
       <dsp:txXfrm>
-        <a:off x="5189550" y="57562"/>
-        <a:ext cx="1677458" cy="100774"/>
+        <a:off x="5381072" y="55703"/>
+        <a:ext cx="1739365" cy="104493"/>
       </dsp:txXfrm>
     </dsp:sp>
   </dsp:spTree>
@@ -3977,7 +4012,7 @@
           <a:p>
             <a:fld id="{E47392E8-4B27-A043-97CD-52429228C9B2}" type="datetimeFigureOut">
               <a:rPr kumimoji="1" lang="zh-CN" altLang="en-US" smtClean="0"/>
-              <a:t>27/10/16</a:t>
+              <a:t>02/12/16</a:t>
             </a:fld>
             <a:endParaRPr kumimoji="1" lang="zh-CN" altLang="en-US"/>
           </a:p>
@@ -4147,7 +4182,7 @@
           <a:p>
             <a:fld id="{E47392E8-4B27-A043-97CD-52429228C9B2}" type="datetimeFigureOut">
               <a:rPr kumimoji="1" lang="zh-CN" altLang="en-US" smtClean="0"/>
-              <a:t>27/10/16</a:t>
+              <a:t>02/12/16</a:t>
             </a:fld>
             <a:endParaRPr kumimoji="1" lang="zh-CN" altLang="en-US"/>
           </a:p>
@@ -4327,7 +4362,7 @@
           <a:p>
             <a:fld id="{E47392E8-4B27-A043-97CD-52429228C9B2}" type="datetimeFigureOut">
               <a:rPr kumimoji="1" lang="zh-CN" altLang="en-US" smtClean="0"/>
-              <a:t>27/10/16</a:t>
+              <a:t>02/12/16</a:t>
             </a:fld>
             <a:endParaRPr kumimoji="1" lang="zh-CN" altLang="en-US"/>
           </a:p>
@@ -4497,7 +4532,7 @@
           <a:p>
             <a:fld id="{E47392E8-4B27-A043-97CD-52429228C9B2}" type="datetimeFigureOut">
               <a:rPr kumimoji="1" lang="zh-CN" altLang="en-US" smtClean="0"/>
-              <a:t>27/10/16</a:t>
+              <a:t>02/12/16</a:t>
             </a:fld>
             <a:endParaRPr kumimoji="1" lang="zh-CN" altLang="en-US"/>
           </a:p>
@@ -4743,7 +4778,7 @@
           <a:p>
             <a:fld id="{E47392E8-4B27-A043-97CD-52429228C9B2}" type="datetimeFigureOut">
               <a:rPr kumimoji="1" lang="zh-CN" altLang="en-US" smtClean="0"/>
-              <a:t>27/10/16</a:t>
+              <a:t>02/12/16</a:t>
             </a:fld>
             <a:endParaRPr kumimoji="1" lang="zh-CN" altLang="en-US"/>
           </a:p>
@@ -5031,7 +5066,7 @@
           <a:p>
             <a:fld id="{E47392E8-4B27-A043-97CD-52429228C9B2}" type="datetimeFigureOut">
               <a:rPr kumimoji="1" lang="zh-CN" altLang="en-US" smtClean="0"/>
-              <a:t>27/10/16</a:t>
+              <a:t>02/12/16</a:t>
             </a:fld>
             <a:endParaRPr kumimoji="1" lang="zh-CN" altLang="en-US"/>
           </a:p>
@@ -5453,7 +5488,7 @@
           <a:p>
             <a:fld id="{E47392E8-4B27-A043-97CD-52429228C9B2}" type="datetimeFigureOut">
               <a:rPr kumimoji="1" lang="zh-CN" altLang="en-US" smtClean="0"/>
-              <a:t>27/10/16</a:t>
+              <a:t>02/12/16</a:t>
             </a:fld>
             <a:endParaRPr kumimoji="1" lang="zh-CN" altLang="en-US"/>
           </a:p>
@@ -5571,7 +5606,7 @@
           <a:p>
             <a:fld id="{E47392E8-4B27-A043-97CD-52429228C9B2}" type="datetimeFigureOut">
               <a:rPr kumimoji="1" lang="zh-CN" altLang="en-US" smtClean="0"/>
-              <a:t>27/10/16</a:t>
+              <a:t>02/12/16</a:t>
             </a:fld>
             <a:endParaRPr kumimoji="1" lang="zh-CN" altLang="en-US"/>
           </a:p>
@@ -5666,7 +5701,7 @@
           <a:p>
             <a:fld id="{E47392E8-4B27-A043-97CD-52429228C9B2}" type="datetimeFigureOut">
               <a:rPr kumimoji="1" lang="zh-CN" altLang="en-US" smtClean="0"/>
-              <a:t>27/10/16</a:t>
+              <a:t>02/12/16</a:t>
             </a:fld>
             <a:endParaRPr kumimoji="1" lang="zh-CN" altLang="en-US"/>
           </a:p>
@@ -5943,7 +5978,7 @@
           <a:p>
             <a:fld id="{E47392E8-4B27-A043-97CD-52429228C9B2}" type="datetimeFigureOut">
               <a:rPr kumimoji="1" lang="zh-CN" altLang="en-US" smtClean="0"/>
-              <a:t>27/10/16</a:t>
+              <a:t>02/12/16</a:t>
             </a:fld>
             <a:endParaRPr kumimoji="1" lang="zh-CN" altLang="en-US"/>
           </a:p>
@@ -6196,7 +6231,7 @@
           <a:p>
             <a:fld id="{E47392E8-4B27-A043-97CD-52429228C9B2}" type="datetimeFigureOut">
               <a:rPr kumimoji="1" lang="zh-CN" altLang="en-US" smtClean="0"/>
-              <a:t>27/10/16</a:t>
+              <a:t>02/12/16</a:t>
             </a:fld>
             <a:endParaRPr kumimoji="1" lang="zh-CN" altLang="en-US"/>
           </a:p>
@@ -6409,7 +6444,7 @@
           <a:p>
             <a:fld id="{E47392E8-4B27-A043-97CD-52429228C9B2}" type="datetimeFigureOut">
               <a:rPr kumimoji="1" lang="zh-CN" altLang="en-US" smtClean="0"/>
-              <a:t>27/10/16</a:t>
+              <a:t>02/12/16</a:t>
             </a:fld>
             <a:endParaRPr kumimoji="1" lang="zh-CN" altLang="en-US"/>
           </a:p>
@@ -6790,11 +6825,17 @@
           <p:cNvGraphicFramePr>
             <a:graphicFrameLocks/>
           </p:cNvGraphicFramePr>
-          <p:nvPr/>
+          <p:nvPr>
+            <p:extLst>
+              <p:ext uri="{D42A27DB-BD31-4B8C-83A1-F6EECF244321}">
+                <p14:modId xmlns:p14="http://schemas.microsoft.com/office/powerpoint/2010/main" val="496000236"/>
+              </p:ext>
+            </p:extLst>
+          </p:nvPr>
         </p:nvGraphicFramePr>
         <p:xfrm>
-          <a:off x="142081" y="119062"/>
-          <a:ext cx="8356600" cy="4800600"/>
+          <a:off x="-1" y="-1"/>
+          <a:ext cx="8640763" cy="5038725"/>
         </p:xfrm>
         <a:graphic>
           <a:graphicData uri="http://schemas.openxmlformats.org/drawingml/2006/chart">
@@ -6806,11 +6847,17 @@
         <p:nvGraphicFramePr>
           <p:cNvPr id="9" name="图表 8"/>
           <p:cNvGraphicFramePr/>
-          <p:nvPr/>
+          <p:nvPr>
+            <p:extLst>
+              <p:ext uri="{D42A27DB-BD31-4B8C-83A1-F6EECF244321}">
+                <p14:modId xmlns:p14="http://schemas.microsoft.com/office/powerpoint/2010/main" val="3456318051"/>
+              </p:ext>
+            </p:extLst>
+          </p:nvPr>
         </p:nvGraphicFramePr>
         <p:xfrm>
-          <a:off x="789781" y="4602162"/>
-          <a:ext cx="6870700" cy="215900"/>
+          <a:off x="657486" y="4656210"/>
+          <a:ext cx="7124265" cy="215900"/>
         </p:xfrm>
         <a:graphic>
           <a:graphicData uri="http://schemas.openxmlformats.org/drawingml/2006/diagram">

</xml_diff>